<commit_message>
Pushed PPT and MVP ERD design
</commit_message>
<xml_diff>
--- a/W5Project/PPT/GROUP 1-Week 5.pptx
+++ b/W5Project/PPT/GROUP 1-Week 5.pptx
@@ -10,8 +10,8 @@
     <p:sldId id="259" r:id="rId4"/>
     <p:sldId id="258" r:id="rId5"/>
     <p:sldId id="261" r:id="rId6"/>
-    <p:sldId id="260" r:id="rId7"/>
-    <p:sldId id="262" r:id="rId8"/>
+    <p:sldId id="262" r:id="rId7"/>
+    <p:sldId id="260" r:id="rId8"/>
   </p:sldIdLst>
   <p:sldSz cx="12192000" cy="6858000"/>
   <p:notesSz cx="6858000" cy="9144000"/>
@@ -110,6 +110,11 @@
       </a:defRPr>
     </a:lvl9pPr>
   </p:defaultTextStyle>
+  <p:extLst>
+    <p:ext uri="{EFAFB233-063F-42B5-8137-9DF3F51BA10A}">
+      <p15:sldGuideLst xmlns:p15="http://schemas.microsoft.com/office/powerpoint/2012/main"/>
+    </p:ext>
+  </p:extLst>
 </p:presentation>
 </file>
 
@@ -836,7 +841,7 @@
             <a:fld id="{B61BEF0D-F0BB-DE4B-95CE-6DB70DBA9567}" type="datetimeFigureOut">
               <a:rPr lang="en-US" dirty="0"/>
               <a:pPr/>
-              <a:t>7/17/2016</a:t>
+              <a:t>7/18/2016</a:t>
             </a:fld>
             <a:endParaRPr lang="en-US" dirty="0"/>
           </a:p>
@@ -1084,7 +1089,7 @@
             <a:fld id="{B61BEF0D-F0BB-DE4B-95CE-6DB70DBA9567}" type="datetimeFigureOut">
               <a:rPr lang="en-US" dirty="0"/>
               <a:pPr/>
-              <a:t>7/17/2016</a:t>
+              <a:t>7/18/2016</a:t>
             </a:fld>
             <a:endParaRPr lang="en-US" dirty="0"/>
           </a:p>
@@ -1395,7 +1400,7 @@
             <a:fld id="{B61BEF0D-F0BB-DE4B-95CE-6DB70DBA9567}" type="datetimeFigureOut">
               <a:rPr lang="en-US" dirty="0"/>
               <a:pPr/>
-              <a:t>7/17/2016</a:t>
+              <a:t>7/18/2016</a:t>
             </a:fld>
             <a:endParaRPr lang="en-US" dirty="0"/>
           </a:p>
@@ -1733,7 +1738,7 @@
             <a:fld id="{B61BEF0D-F0BB-DE4B-95CE-6DB70DBA9567}" type="datetimeFigureOut">
               <a:rPr lang="en-US" dirty="0"/>
               <a:pPr/>
-              <a:t>7/17/2016</a:t>
+              <a:t>7/18/2016</a:t>
             </a:fld>
             <a:endParaRPr lang="en-US" dirty="0"/>
           </a:p>
@@ -2044,7 +2049,7 @@
             <a:fld id="{B61BEF0D-F0BB-DE4B-95CE-6DB70DBA9567}" type="datetimeFigureOut">
               <a:rPr lang="en-US" dirty="0"/>
               <a:pPr/>
-              <a:t>7/17/2016</a:t>
+              <a:t>7/18/2016</a:t>
             </a:fld>
             <a:endParaRPr lang="en-US" dirty="0"/>
           </a:p>
@@ -2434,7 +2439,7 @@
             <a:fld id="{B61BEF0D-F0BB-DE4B-95CE-6DB70DBA9567}" type="datetimeFigureOut">
               <a:rPr lang="en-US" dirty="0"/>
               <a:pPr/>
-              <a:t>7/17/2016</a:t>
+              <a:t>7/18/2016</a:t>
             </a:fld>
             <a:endParaRPr lang="en-US" dirty="0"/>
           </a:p>
@@ -2600,7 +2605,7 @@
           <a:p>
             <a:fld id="{55C6B4A9-1611-4792-9094-5F34BCA07E0B}" type="datetimeFigureOut">
               <a:rPr lang="en-US" dirty="0"/>
-              <a:t>7/17/2016</a:t>
+              <a:t>7/18/2016</a:t>
             </a:fld>
             <a:endParaRPr lang="en-US" dirty="0"/>
           </a:p>
@@ -2776,7 +2781,7 @@
             <a:fld id="{B61BEF0D-F0BB-DE4B-95CE-6DB70DBA9567}" type="datetimeFigureOut">
               <a:rPr lang="en-US" dirty="0"/>
               <a:pPr/>
-              <a:t>7/17/2016</a:t>
+              <a:t>7/18/2016</a:t>
             </a:fld>
             <a:endParaRPr lang="en-US" dirty="0"/>
           </a:p>
@@ -2949,7 +2954,7 @@
             <a:fld id="{B61BEF0D-F0BB-DE4B-95CE-6DB70DBA9567}" type="datetimeFigureOut">
               <a:rPr lang="en-US" dirty="0"/>
               <a:pPr/>
-              <a:t>7/17/2016</a:t>
+              <a:t>7/18/2016</a:t>
             </a:fld>
             <a:endParaRPr lang="en-US" dirty="0"/>
           </a:p>
@@ -3193,7 +3198,7 @@
             <a:fld id="{B61BEF0D-F0BB-DE4B-95CE-6DB70DBA9567}" type="datetimeFigureOut">
               <a:rPr lang="en-US" dirty="0"/>
               <a:pPr/>
-              <a:t>7/17/2016</a:t>
+              <a:t>7/18/2016</a:t>
             </a:fld>
             <a:endParaRPr lang="en-US" dirty="0"/>
           </a:p>
@@ -3421,7 +3426,7 @@
           <a:p>
             <a:fld id="{EB712588-04B1-427B-82EE-E8DB90309F08}" type="datetimeFigureOut">
               <a:rPr lang="en-US" dirty="0"/>
-              <a:t>7/17/2016</a:t>
+              <a:t>7/18/2016</a:t>
             </a:fld>
             <a:endParaRPr lang="en-US" dirty="0"/>
           </a:p>
@@ -3791,7 +3796,7 @@
             <a:fld id="{B61BEF0D-F0BB-DE4B-95CE-6DB70DBA9567}" type="datetimeFigureOut">
               <a:rPr lang="en-US" dirty="0"/>
               <a:pPr/>
-              <a:t>7/17/2016</a:t>
+              <a:t>7/18/2016</a:t>
             </a:fld>
             <a:endParaRPr lang="en-US" dirty="0"/>
           </a:p>
@@ -3911,7 +3916,7 @@
             <a:fld id="{B61BEF0D-F0BB-DE4B-95CE-6DB70DBA9567}" type="datetimeFigureOut">
               <a:rPr lang="en-US" dirty="0"/>
               <a:pPr/>
-              <a:t>7/17/2016</a:t>
+              <a:t>7/18/2016</a:t>
             </a:fld>
             <a:endParaRPr lang="en-US" dirty="0"/>
           </a:p>
@@ -4003,7 +4008,7 @@
             <a:fld id="{B61BEF0D-F0BB-DE4B-95CE-6DB70DBA9567}" type="datetimeFigureOut">
               <a:rPr lang="en-US" dirty="0"/>
               <a:pPr/>
-              <a:t>7/17/2016</a:t>
+              <a:t>7/18/2016</a:t>
             </a:fld>
             <a:endParaRPr lang="en-US" dirty="0"/>
           </a:p>
@@ -4254,7 +4259,7 @@
           <a:p>
             <a:fld id="{42A54C80-263E-416B-A8E0-580EDEADCBDC}" type="datetimeFigureOut">
               <a:rPr lang="en-US" dirty="0"/>
-              <a:t>7/17/2016</a:t>
+              <a:t>7/18/2016</a:t>
             </a:fld>
             <a:endParaRPr lang="en-US" dirty="0"/>
           </a:p>
@@ -4513,7 +4518,7 @@
             <a:fld id="{B61BEF0D-F0BB-DE4B-95CE-6DB70DBA9567}" type="datetimeFigureOut">
               <a:rPr lang="en-US" dirty="0"/>
               <a:pPr/>
-              <a:t>7/17/2016</a:t>
+              <a:t>7/18/2016</a:t>
             </a:fld>
             <a:endParaRPr lang="en-US" dirty="0"/>
           </a:p>
@@ -5253,7 +5258,7 @@
             <a:fld id="{B61BEF0D-F0BB-DE4B-95CE-6DB70DBA9567}" type="datetimeFigureOut">
               <a:rPr lang="en-US" dirty="0"/>
               <a:pPr/>
-              <a:t>7/17/2016</a:t>
+              <a:t>7/18/2016</a:t>
             </a:fld>
             <a:endParaRPr lang="en-US" dirty="0"/>
           </a:p>
@@ -5963,15 +5968,7 @@
             <a:pPr lvl="1"/>
             <a:r>
               <a:rPr lang="en-US" dirty="0"/>
-              <a:t>Filter (certain names) and Listeners (Active </a:t>
-            </a:r>
-            <a:r>
-              <a:rPr lang="en-US"/>
-              <a:t>Users and Session</a:t>
-            </a:r>
-            <a:r>
-              <a:rPr lang="en-US" dirty="0"/>
-              <a:t>)</a:t>
+              <a:t>Filter (certain names) and Listeners (Active Users and Session)</a:t>
             </a:r>
           </a:p>
           <a:p>
@@ -6238,7 +6235,7 @@
             </a:r>
             <a:r>
               <a:rPr lang="en-US" dirty="0"/>
-              <a:t> – Initial body of Spring Project with transaction in DB.</a:t>
+              <a:t> – Initial body of Spring Project with initial transaction in DB.</a:t>
             </a:r>
           </a:p>
           <a:p>
@@ -6282,7 +6279,7 @@
             <a:pPr lvl="1"/>
             <a:r>
               <a:rPr lang="en-US" dirty="0"/>
-              <a:t>Mark Anthony Andes</a:t>
+              <a:t>Mark Anthony Andes – Tester (Functional and Black tester)</a:t>
             </a:r>
           </a:p>
           <a:p>
@@ -6378,7 +6375,7 @@
         </p:spPr>
         <p:txBody>
           <a:bodyPr>
-            <a:normAutofit/>
+            <a:normAutofit fontScale="92500" lnSpcReduction="20000"/>
           </a:bodyPr>
           <a:lstStyle/>
           <a:p>
@@ -6390,36 +6387,50 @@
           <a:p>
             <a:pPr lvl="1"/>
             <a:r>
-              <a:rPr lang="en-US" b="1" dirty="0"/>
+              <a:rPr lang="en-US" dirty="0"/>
               <a:t>CRUD tray of the user’s orders</a:t>
             </a:r>
           </a:p>
           <a:p>
             <a:pPr lvl="1"/>
             <a:r>
-              <a:rPr lang="en-US" b="1" dirty="0"/>
+              <a:rPr lang="en-US" dirty="0"/>
               <a:t>Browse products</a:t>
             </a:r>
           </a:p>
           <a:p>
             <a:pPr lvl="1"/>
             <a:r>
-              <a:rPr lang="en-US" b="1" dirty="0"/>
+              <a:rPr lang="en-US" dirty="0"/>
               <a:t>Basic validations (login and registration)</a:t>
             </a:r>
           </a:p>
           <a:p>
             <a:pPr lvl="1"/>
             <a:r>
-              <a:rPr lang="en-US" b="1" dirty="0"/>
+              <a:rPr lang="en-US" dirty="0"/>
               <a:t>Can block blocked users</a:t>
             </a:r>
           </a:p>
           <a:p>
             <a:pPr lvl="1"/>
             <a:r>
-              <a:rPr lang="en-US" b="1" dirty="0"/>
+              <a:rPr lang="en-US" dirty="0"/>
               <a:t>Can display active users</a:t>
+            </a:r>
+          </a:p>
+          <a:p>
+            <a:pPr lvl="1"/>
+            <a:r>
+              <a:rPr lang="en-US" dirty="0"/>
+              <a:t>It can search products</a:t>
+            </a:r>
+          </a:p>
+          <a:p>
+            <a:pPr lvl="1"/>
+            <a:r>
+              <a:rPr lang="en-US" dirty="0"/>
+              <a:t>Has incorporated log4j</a:t>
             </a:r>
           </a:p>
           <a:p>
@@ -6437,29 +6448,36 @@
           <a:p>
             <a:pPr lvl="1"/>
             <a:r>
-              <a:rPr lang="en-US" b="1" dirty="0"/>
+              <a:rPr lang="en-US" dirty="0"/>
               <a:t>The items in the cart will be removed after the user logged out of the system.</a:t>
             </a:r>
           </a:p>
           <a:p>
             <a:pPr lvl="1"/>
             <a:r>
-              <a:rPr lang="en-US" b="1" dirty="0"/>
+              <a:rPr lang="en-US" dirty="0"/>
               <a:t>No paging</a:t>
             </a:r>
           </a:p>
           <a:p>
             <a:pPr lvl="1"/>
             <a:r>
-              <a:rPr lang="en-US" b="1" dirty="0"/>
+              <a:rPr lang="en-US" dirty="0"/>
               <a:t>No Spring Validator</a:t>
             </a:r>
           </a:p>
           <a:p>
             <a:pPr lvl="1"/>
             <a:r>
-              <a:rPr lang="en-US" b="1" dirty="0"/>
+              <a:rPr lang="en-US" dirty="0"/>
               <a:t>Other approach for filter</a:t>
+            </a:r>
+          </a:p>
+          <a:p>
+            <a:pPr lvl="1"/>
+            <a:r>
+              <a:rPr lang="en-US" dirty="0"/>
+              <a:t>No JUNIT </a:t>
             </a:r>
           </a:p>
           <a:p>
@@ -6512,45 +6530,654 @@
             <p:ph type="title"/>
           </p:nvPr>
         </p:nvSpPr>
-        <p:spPr/>
-        <p:txBody>
-          <a:bodyPr/>
-          <a:lstStyle/>
-          <a:p>
-            <a:r>
-              <a:rPr lang="en-US" dirty="0"/>
-              <a:t>SQL</a:t>
-            </a:r>
-          </a:p>
-        </p:txBody>
-      </p:sp>
-      <p:pic>
-        <p:nvPicPr>
-          <p:cNvPr id="4" name="Content Placeholder 3"/>
-          <p:cNvPicPr>
-            <a:picLocks noGrp="1" noChangeAspect="1"/>
-          </p:cNvPicPr>
-          <p:nvPr>
-            <p:ph idx="1"/>
-          </p:nvPr>
-        </p:nvPicPr>
-        <p:blipFill>
-          <a:blip r:embed="rId2"/>
-          <a:stretch>
-            <a:fillRect/>
-          </a:stretch>
-        </p:blipFill>
         <p:spPr>
           <a:xfrm>
-            <a:off x="1245704" y="1124413"/>
-            <a:ext cx="10124661" cy="5548056"/>
+            <a:off x="193240" y="609600"/>
+            <a:ext cx="5521760" cy="762000"/>
           </a:xfrm>
         </p:spPr>
-      </p:pic>
+        <p:txBody>
+          <a:bodyPr>
+            <a:normAutofit fontScale="90000"/>
+          </a:bodyPr>
+          <a:lstStyle/>
+          <a:p>
+            <a:pPr algn="ctr"/>
+            <a:r>
+              <a:rPr lang="en-US" dirty="0"/>
+              <a:t>PLAN</a:t>
+            </a:r>
+            <a:br>
+              <a:rPr lang="en-US" dirty="0"/>
+            </a:br>
+            <a:endParaRPr lang="en-US" dirty="0"/>
+          </a:p>
+        </p:txBody>
+      </p:sp>
+      <p:sp>
+        <p:nvSpPr>
+          <p:cNvPr id="3" name="Content Placeholder 2"/>
+          <p:cNvSpPr>
+            <a:spLocks noGrp="1"/>
+          </p:cNvSpPr>
+          <p:nvPr>
+            <p:ph idx="1"/>
+          </p:nvPr>
+        </p:nvSpPr>
+        <p:spPr>
+          <a:xfrm>
+            <a:off x="193240" y="1519518"/>
+            <a:ext cx="5521760" cy="4669762"/>
+          </a:xfrm>
+        </p:spPr>
+        <p:txBody>
+          <a:bodyPr/>
+          <a:lstStyle/>
+          <a:p>
+            <a:r>
+              <a:rPr lang="en-US" dirty="0"/>
+              <a:t>Friday </a:t>
+            </a:r>
+          </a:p>
+          <a:p>
+            <a:pPr lvl="1"/>
+            <a:r>
+              <a:rPr lang="en-US" dirty="0"/>
+              <a:t>Exploration</a:t>
+            </a:r>
+          </a:p>
+          <a:p>
+            <a:pPr lvl="1"/>
+            <a:r>
+              <a:rPr lang="en-US" dirty="0"/>
+              <a:t>Initialize Project with JDBC Template and JTA</a:t>
+            </a:r>
+          </a:p>
+          <a:p>
+            <a:pPr lvl="1"/>
+            <a:r>
+              <a:rPr lang="en-US" dirty="0"/>
+              <a:t>Mock-up UI in Ext JS</a:t>
+            </a:r>
+          </a:p>
+          <a:p>
+            <a:r>
+              <a:rPr lang="en-US" dirty="0"/>
+              <a:t>Saturday </a:t>
+            </a:r>
+          </a:p>
+          <a:p>
+            <a:pPr lvl="1"/>
+            <a:r>
+              <a:rPr lang="en-US" dirty="0"/>
+              <a:t>Integration of UI </a:t>
+            </a:r>
+          </a:p>
+          <a:p>
+            <a:pPr lvl="1"/>
+            <a:r>
+              <a:rPr lang="en-US" dirty="0"/>
+              <a:t>Finish All controller service (MVP)</a:t>
+            </a:r>
+          </a:p>
+          <a:p>
+            <a:pPr lvl="1"/>
+            <a:r>
+              <a:rPr lang="en-US" dirty="0"/>
+              <a:t>Finish all UI page (Transitions and Behavior)(MVP)</a:t>
+            </a:r>
+          </a:p>
+          <a:p>
+            <a:r>
+              <a:rPr lang="en-US" dirty="0"/>
+              <a:t>By Saturday the project (MVP) status is finished </a:t>
+            </a:r>
+          </a:p>
+          <a:p>
+            <a:r>
+              <a:rPr lang="en-US" dirty="0"/>
+              <a:t>Sunday</a:t>
+            </a:r>
+          </a:p>
+          <a:p>
+            <a:pPr lvl="1"/>
+            <a:r>
+              <a:rPr lang="en-US" dirty="0"/>
+              <a:t>Apply nice to have features (admin, </a:t>
+            </a:r>
+            <a:r>
+              <a:rPr lang="en-US" dirty="0" err="1"/>
+              <a:t>etc</a:t>
+            </a:r>
+            <a:r>
+              <a:rPr lang="en-US" dirty="0"/>
+              <a:t> )</a:t>
+            </a:r>
+          </a:p>
+          <a:p>
+            <a:pPr lvl="1"/>
+            <a:r>
+              <a:rPr lang="en-US" dirty="0">
+                <a:solidFill>
+                  <a:srgbClr val="00B050"/>
+                </a:solidFill>
+              </a:rPr>
+              <a:t>REST </a:t>
+            </a:r>
+            <a:r>
+              <a:rPr lang="en-US" dirty="0">
+                <a:solidFill>
+                  <a:srgbClr val="00B050"/>
+                </a:solidFill>
+                <a:sym typeface="Wingdings" panose="05000000000000000000" pitchFamily="2" charset="2"/>
+              </a:rPr>
+              <a:t></a:t>
+            </a:r>
+            <a:endParaRPr lang="en-US" dirty="0">
+              <a:solidFill>
+                <a:srgbClr val="00B050"/>
+              </a:solidFill>
+            </a:endParaRPr>
+          </a:p>
+          <a:p>
+            <a:endParaRPr lang="en-US" dirty="0"/>
+          </a:p>
+          <a:p>
+            <a:endParaRPr lang="en-US" dirty="0"/>
+          </a:p>
+          <a:p>
+            <a:pPr marL="0" indent="0">
+              <a:buNone/>
+            </a:pPr>
+            <a:endParaRPr lang="en-US" dirty="0"/>
+          </a:p>
+        </p:txBody>
+      </p:sp>
+      <p:sp>
+        <p:nvSpPr>
+          <p:cNvPr id="4" name="Title 1"/>
+          <p:cNvSpPr txBox="1">
+            <a:spLocks/>
+          </p:cNvSpPr>
+          <p:nvPr/>
+        </p:nvSpPr>
+        <p:spPr>
+          <a:xfrm>
+            <a:off x="5715000" y="757517"/>
+            <a:ext cx="5521760" cy="762000"/>
+          </a:xfrm>
+          <a:prstGeom prst="rect">
+            <a:avLst/>
+          </a:prstGeom>
+        </p:spPr>
+        <p:txBody>
+          <a:bodyPr vert="horz" lIns="91440" tIns="45720" rIns="91440" bIns="45720" rtlCol="0" anchor="t">
+            <a:normAutofit fontScale="75000" lnSpcReduction="20000"/>
+          </a:bodyPr>
+          <a:lstStyle>
+            <a:lvl1pPr algn="l" defTabSz="457200" rtl="0" eaLnBrk="1" latinLnBrk="0" hangingPunct="1">
+              <a:spcBef>
+                <a:spcPct val="0"/>
+              </a:spcBef>
+              <a:buNone/>
+              <a:defRPr sz="3600" kern="1200">
+                <a:solidFill>
+                  <a:schemeClr val="accent1"/>
+                </a:solidFill>
+                <a:latin typeface="+mj-lt"/>
+                <a:ea typeface="+mj-ea"/>
+                <a:cs typeface="+mj-cs"/>
+              </a:defRPr>
+            </a:lvl1pPr>
+            <a:lvl2pPr eaLnBrk="1" hangingPunct="1">
+              <a:defRPr>
+                <a:solidFill>
+                  <a:schemeClr val="tx2"/>
+                </a:solidFill>
+              </a:defRPr>
+            </a:lvl2pPr>
+            <a:lvl3pPr eaLnBrk="1" hangingPunct="1">
+              <a:defRPr>
+                <a:solidFill>
+                  <a:schemeClr val="tx2"/>
+                </a:solidFill>
+              </a:defRPr>
+            </a:lvl3pPr>
+            <a:lvl4pPr eaLnBrk="1" hangingPunct="1">
+              <a:defRPr>
+                <a:solidFill>
+                  <a:schemeClr val="tx2"/>
+                </a:solidFill>
+              </a:defRPr>
+            </a:lvl4pPr>
+            <a:lvl5pPr eaLnBrk="1" hangingPunct="1">
+              <a:defRPr>
+                <a:solidFill>
+                  <a:schemeClr val="tx2"/>
+                </a:solidFill>
+              </a:defRPr>
+            </a:lvl5pPr>
+            <a:lvl6pPr eaLnBrk="1" hangingPunct="1">
+              <a:defRPr>
+                <a:solidFill>
+                  <a:schemeClr val="tx2"/>
+                </a:solidFill>
+              </a:defRPr>
+            </a:lvl6pPr>
+            <a:lvl7pPr eaLnBrk="1" hangingPunct="1">
+              <a:defRPr>
+                <a:solidFill>
+                  <a:schemeClr val="tx2"/>
+                </a:solidFill>
+              </a:defRPr>
+            </a:lvl7pPr>
+            <a:lvl8pPr eaLnBrk="1" hangingPunct="1">
+              <a:defRPr>
+                <a:solidFill>
+                  <a:schemeClr val="tx2"/>
+                </a:solidFill>
+              </a:defRPr>
+            </a:lvl8pPr>
+            <a:lvl9pPr eaLnBrk="1" hangingPunct="1">
+              <a:defRPr>
+                <a:solidFill>
+                  <a:schemeClr val="tx2"/>
+                </a:solidFill>
+              </a:defRPr>
+            </a:lvl9pPr>
+          </a:lstStyle>
+          <a:p>
+            <a:pPr algn="ctr"/>
+            <a:r>
+              <a:rPr lang="en-US" dirty="0"/>
+              <a:t>ACTUAL</a:t>
+            </a:r>
+            <a:br>
+              <a:rPr lang="en-US" dirty="0"/>
+            </a:br>
+            <a:endParaRPr lang="en-US" dirty="0"/>
+          </a:p>
+        </p:txBody>
+      </p:sp>
+      <p:sp>
+        <p:nvSpPr>
+          <p:cNvPr id="5" name="Content Placeholder 2"/>
+          <p:cNvSpPr txBox="1">
+            <a:spLocks/>
+          </p:cNvSpPr>
+          <p:nvPr/>
+        </p:nvSpPr>
+        <p:spPr>
+          <a:xfrm>
+            <a:off x="5715000" y="1445559"/>
+            <a:ext cx="5521760" cy="4669762"/>
+          </a:xfrm>
+          <a:prstGeom prst="rect">
+            <a:avLst/>
+          </a:prstGeom>
+        </p:spPr>
+        <p:txBody>
+          <a:bodyPr vert="horz" lIns="91440" tIns="45720" rIns="91440" bIns="45720" rtlCol="0">
+            <a:normAutofit/>
+          </a:bodyPr>
+          <a:lstStyle>
+            <a:lvl1pPr marL="342900" indent="-342900" algn="l" defTabSz="457200" rtl="0" eaLnBrk="1" latinLnBrk="0" hangingPunct="1">
+              <a:spcBef>
+                <a:spcPts val="1000"/>
+              </a:spcBef>
+              <a:spcAft>
+                <a:spcPts val="0"/>
+              </a:spcAft>
+              <a:buClr>
+                <a:schemeClr val="accent1"/>
+              </a:buClr>
+              <a:buSzPct val="80000"/>
+              <a:buFont typeface="Wingdings 3" charset="2"/>
+              <a:buChar char=""/>
+              <a:defRPr sz="1800" kern="1200">
+                <a:solidFill>
+                  <a:schemeClr val="tx1">
+                    <a:lumMod val="75000"/>
+                    <a:lumOff val="25000"/>
+                  </a:schemeClr>
+                </a:solidFill>
+                <a:latin typeface="+mn-lt"/>
+                <a:ea typeface="+mn-ea"/>
+                <a:cs typeface="+mn-cs"/>
+              </a:defRPr>
+            </a:lvl1pPr>
+            <a:lvl2pPr marL="742950" indent="-285750" algn="l" defTabSz="457200" rtl="0" eaLnBrk="1" latinLnBrk="0" hangingPunct="1">
+              <a:spcBef>
+                <a:spcPts val="1000"/>
+              </a:spcBef>
+              <a:spcAft>
+                <a:spcPts val="0"/>
+              </a:spcAft>
+              <a:buClr>
+                <a:schemeClr val="accent1"/>
+              </a:buClr>
+              <a:buSzPct val="80000"/>
+              <a:buFont typeface="Wingdings 3" charset="2"/>
+              <a:buChar char=""/>
+              <a:defRPr sz="1600" kern="1200">
+                <a:solidFill>
+                  <a:schemeClr val="tx1">
+                    <a:lumMod val="75000"/>
+                    <a:lumOff val="25000"/>
+                  </a:schemeClr>
+                </a:solidFill>
+                <a:latin typeface="+mn-lt"/>
+                <a:ea typeface="+mn-ea"/>
+                <a:cs typeface="+mn-cs"/>
+              </a:defRPr>
+            </a:lvl2pPr>
+            <a:lvl3pPr marL="1143000" indent="-228600" algn="l" defTabSz="457200" rtl="0" eaLnBrk="1" latinLnBrk="0" hangingPunct="1">
+              <a:spcBef>
+                <a:spcPts val="1000"/>
+              </a:spcBef>
+              <a:spcAft>
+                <a:spcPts val="0"/>
+              </a:spcAft>
+              <a:buClr>
+                <a:schemeClr val="accent1"/>
+              </a:buClr>
+              <a:buSzPct val="80000"/>
+              <a:buFont typeface="Wingdings 3" charset="2"/>
+              <a:buChar char=""/>
+              <a:defRPr sz="1400" kern="1200">
+                <a:solidFill>
+                  <a:schemeClr val="tx1">
+                    <a:lumMod val="75000"/>
+                    <a:lumOff val="25000"/>
+                  </a:schemeClr>
+                </a:solidFill>
+                <a:latin typeface="+mn-lt"/>
+                <a:ea typeface="+mn-ea"/>
+                <a:cs typeface="+mn-cs"/>
+              </a:defRPr>
+            </a:lvl3pPr>
+            <a:lvl4pPr marL="1600200" indent="-228600" algn="l" defTabSz="457200" rtl="0" eaLnBrk="1" latinLnBrk="0" hangingPunct="1">
+              <a:spcBef>
+                <a:spcPts val="1000"/>
+              </a:spcBef>
+              <a:spcAft>
+                <a:spcPts val="0"/>
+              </a:spcAft>
+              <a:buClr>
+                <a:schemeClr val="accent1"/>
+              </a:buClr>
+              <a:buSzPct val="80000"/>
+              <a:buFont typeface="Wingdings 3" charset="2"/>
+              <a:buChar char=""/>
+              <a:defRPr sz="1200" kern="1200">
+                <a:solidFill>
+                  <a:schemeClr val="tx1">
+                    <a:lumMod val="75000"/>
+                    <a:lumOff val="25000"/>
+                  </a:schemeClr>
+                </a:solidFill>
+                <a:latin typeface="+mn-lt"/>
+                <a:ea typeface="+mn-ea"/>
+                <a:cs typeface="+mn-cs"/>
+              </a:defRPr>
+            </a:lvl4pPr>
+            <a:lvl5pPr marL="2057400" indent="-228600" algn="l" defTabSz="457200" rtl="0" eaLnBrk="1" latinLnBrk="0" hangingPunct="1">
+              <a:spcBef>
+                <a:spcPts val="1000"/>
+              </a:spcBef>
+              <a:spcAft>
+                <a:spcPts val="0"/>
+              </a:spcAft>
+              <a:buClr>
+                <a:schemeClr val="accent1"/>
+              </a:buClr>
+              <a:buSzPct val="80000"/>
+              <a:buFont typeface="Wingdings 3" charset="2"/>
+              <a:buChar char=""/>
+              <a:defRPr sz="1200" kern="1200">
+                <a:solidFill>
+                  <a:schemeClr val="tx1">
+                    <a:lumMod val="75000"/>
+                    <a:lumOff val="25000"/>
+                  </a:schemeClr>
+                </a:solidFill>
+                <a:latin typeface="+mn-lt"/>
+                <a:ea typeface="+mn-ea"/>
+                <a:cs typeface="+mn-cs"/>
+              </a:defRPr>
+            </a:lvl5pPr>
+            <a:lvl6pPr marL="2514600" indent="-228600" algn="l" defTabSz="457200" rtl="0" eaLnBrk="1" latinLnBrk="0" hangingPunct="1">
+              <a:spcBef>
+                <a:spcPts val="1000"/>
+              </a:spcBef>
+              <a:spcAft>
+                <a:spcPts val="0"/>
+              </a:spcAft>
+              <a:buClr>
+                <a:schemeClr val="accent1"/>
+              </a:buClr>
+              <a:buSzPct val="80000"/>
+              <a:buFont typeface="Wingdings 3" charset="2"/>
+              <a:buChar char=""/>
+              <a:defRPr sz="1200" kern="1200">
+                <a:solidFill>
+                  <a:schemeClr val="tx1">
+                    <a:lumMod val="75000"/>
+                    <a:lumOff val="25000"/>
+                  </a:schemeClr>
+                </a:solidFill>
+                <a:latin typeface="+mn-lt"/>
+                <a:ea typeface="+mn-ea"/>
+                <a:cs typeface="+mn-cs"/>
+              </a:defRPr>
+            </a:lvl6pPr>
+            <a:lvl7pPr marL="2971800" indent="-228600" algn="l" defTabSz="457200" rtl="0" eaLnBrk="1" latinLnBrk="0" hangingPunct="1">
+              <a:spcBef>
+                <a:spcPts val="1000"/>
+              </a:spcBef>
+              <a:spcAft>
+                <a:spcPts val="0"/>
+              </a:spcAft>
+              <a:buClr>
+                <a:schemeClr val="accent1"/>
+              </a:buClr>
+              <a:buSzPct val="80000"/>
+              <a:buFont typeface="Wingdings 3" charset="2"/>
+              <a:buChar char=""/>
+              <a:defRPr sz="1200" kern="1200">
+                <a:solidFill>
+                  <a:schemeClr val="tx1">
+                    <a:lumMod val="75000"/>
+                    <a:lumOff val="25000"/>
+                  </a:schemeClr>
+                </a:solidFill>
+                <a:latin typeface="+mn-lt"/>
+                <a:ea typeface="+mn-ea"/>
+                <a:cs typeface="+mn-cs"/>
+              </a:defRPr>
+            </a:lvl7pPr>
+            <a:lvl8pPr marL="3429000" indent="-228600" algn="l" defTabSz="457200" rtl="0" eaLnBrk="1" latinLnBrk="0" hangingPunct="1">
+              <a:spcBef>
+                <a:spcPts val="1000"/>
+              </a:spcBef>
+              <a:spcAft>
+                <a:spcPts val="0"/>
+              </a:spcAft>
+              <a:buClr>
+                <a:schemeClr val="accent1"/>
+              </a:buClr>
+              <a:buSzPct val="80000"/>
+              <a:buFont typeface="Wingdings 3" charset="2"/>
+              <a:buChar char=""/>
+              <a:defRPr sz="1200" kern="1200">
+                <a:solidFill>
+                  <a:schemeClr val="tx1">
+                    <a:lumMod val="75000"/>
+                    <a:lumOff val="25000"/>
+                  </a:schemeClr>
+                </a:solidFill>
+                <a:latin typeface="+mn-lt"/>
+                <a:ea typeface="+mn-ea"/>
+                <a:cs typeface="+mn-cs"/>
+              </a:defRPr>
+            </a:lvl8pPr>
+            <a:lvl9pPr marL="3886200" indent="-228600" algn="l" defTabSz="457200" rtl="0" eaLnBrk="1" latinLnBrk="0" hangingPunct="1">
+              <a:spcBef>
+                <a:spcPts val="1000"/>
+              </a:spcBef>
+              <a:spcAft>
+                <a:spcPts val="0"/>
+              </a:spcAft>
+              <a:buClr>
+                <a:schemeClr val="accent1"/>
+              </a:buClr>
+              <a:buSzPct val="80000"/>
+              <a:buFont typeface="Wingdings 3" charset="2"/>
+              <a:buChar char=""/>
+              <a:defRPr sz="1200" kern="1200">
+                <a:solidFill>
+                  <a:schemeClr val="tx1">
+                    <a:lumMod val="75000"/>
+                    <a:lumOff val="25000"/>
+                  </a:schemeClr>
+                </a:solidFill>
+                <a:latin typeface="+mn-lt"/>
+                <a:ea typeface="+mn-ea"/>
+                <a:cs typeface="+mn-cs"/>
+              </a:defRPr>
+            </a:lvl9pPr>
+          </a:lstStyle>
+          <a:p>
+            <a:r>
+              <a:rPr lang="en-US" dirty="0"/>
+              <a:t>Friday </a:t>
+            </a:r>
+          </a:p>
+          <a:p>
+            <a:pPr lvl="1"/>
+            <a:r>
+              <a:rPr lang="en-US" dirty="0"/>
+              <a:t>Exploration</a:t>
+            </a:r>
+          </a:p>
+          <a:p>
+            <a:pPr lvl="1"/>
+            <a:r>
+              <a:rPr lang="en-US" dirty="0"/>
+              <a:t>Initialize Project with JDBC Template and JTA</a:t>
+            </a:r>
+          </a:p>
+          <a:p>
+            <a:pPr lvl="1"/>
+            <a:r>
+              <a:rPr lang="en-US" dirty="0"/>
+              <a:t>Mock-up UI in Ext JS</a:t>
+            </a:r>
+          </a:p>
+          <a:p>
+            <a:r>
+              <a:rPr lang="en-US" dirty="0"/>
+              <a:t>Saturday </a:t>
+            </a:r>
+          </a:p>
+          <a:p>
+            <a:pPr lvl="1"/>
+            <a:r>
+              <a:rPr lang="en-US" dirty="0"/>
+              <a:t>Integration of UI </a:t>
+            </a:r>
+            <a:r>
+              <a:rPr lang="en-US" dirty="0">
+                <a:solidFill>
+                  <a:srgbClr val="FF0000"/>
+                </a:solidFill>
+              </a:rPr>
+              <a:t>(BLOCKER)</a:t>
+            </a:r>
+          </a:p>
+          <a:p>
+            <a:pPr lvl="1"/>
+            <a:r>
+              <a:rPr lang="en-US" strike="sngStrike" dirty="0">
+                <a:solidFill>
+                  <a:srgbClr val="FF0000"/>
+                </a:solidFill>
+              </a:rPr>
+              <a:t>Finish All controller service (MVP)</a:t>
+            </a:r>
+          </a:p>
+          <a:p>
+            <a:pPr lvl="1"/>
+            <a:r>
+              <a:rPr lang="en-US" strike="sngStrike" dirty="0">
+                <a:solidFill>
+                  <a:srgbClr val="FF0000"/>
+                </a:solidFill>
+              </a:rPr>
+              <a:t>Finish all UI page (Transitions and Behavior)(MVP)</a:t>
+            </a:r>
+          </a:p>
+          <a:p>
+            <a:r>
+              <a:rPr lang="en-US" dirty="0"/>
+              <a:t>Sunday</a:t>
+            </a:r>
+          </a:p>
+          <a:p>
+            <a:pPr lvl="1"/>
+            <a:r>
+              <a:rPr lang="en-US" dirty="0"/>
+              <a:t>Finish all controller service (MVP)</a:t>
+            </a:r>
+          </a:p>
+          <a:p>
+            <a:pPr lvl="1"/>
+            <a:r>
+              <a:rPr lang="en-US" dirty="0"/>
+              <a:t>Finish all UI page (Transitions and Behavior)(MVP)</a:t>
+            </a:r>
+          </a:p>
+          <a:p>
+            <a:pPr lvl="1"/>
+            <a:r>
+              <a:rPr lang="en-US" dirty="0">
+                <a:solidFill>
+                  <a:srgbClr val="00B050"/>
+                </a:solidFill>
+              </a:rPr>
+              <a:t>No rest </a:t>
+            </a:r>
+            <a:r>
+              <a:rPr lang="en-US" dirty="0">
+                <a:solidFill>
+                  <a:srgbClr val="00B050"/>
+                </a:solidFill>
+                <a:sym typeface="Wingdings" panose="05000000000000000000" pitchFamily="2" charset="2"/>
+              </a:rPr>
+              <a:t></a:t>
+            </a:r>
+            <a:endParaRPr lang="en-US" dirty="0">
+              <a:solidFill>
+                <a:srgbClr val="00B050"/>
+              </a:solidFill>
+            </a:endParaRPr>
+          </a:p>
+          <a:p>
+            <a:endParaRPr lang="en-US" dirty="0"/>
+          </a:p>
+          <a:p>
+            <a:pPr marL="0" indent="0">
+              <a:buFont typeface="Wingdings 3" charset="2"/>
+              <a:buNone/>
+            </a:pPr>
+            <a:endParaRPr lang="en-US" dirty="0"/>
+          </a:p>
+        </p:txBody>
+      </p:sp>
     </p:spTree>
     <p:extLst>
       <p:ext uri="{BB962C8B-B14F-4D97-AF65-F5344CB8AC3E}">
-        <p14:creationId xmlns:p14="http://schemas.microsoft.com/office/powerpoint/2010/main" val="946687753"/>
+        <p14:creationId xmlns:p14="http://schemas.microsoft.com/office/powerpoint/2010/main" val="2255266962"/>
       </p:ext>
     </p:extLst>
   </p:cSld>
@@ -6594,38 +7221,38 @@
           <a:p>
             <a:r>
               <a:rPr lang="en-US" dirty="0"/>
-              <a:t>Demo</a:t>
-            </a:r>
-            <a:br>
-              <a:rPr lang="en-US" dirty="0"/>
-            </a:br>
-            <a:endParaRPr lang="en-US" dirty="0"/>
-          </a:p>
-        </p:txBody>
-      </p:sp>
-      <p:sp>
-        <p:nvSpPr>
-          <p:cNvPr id="3" name="Content Placeholder 2"/>
-          <p:cNvSpPr>
-            <a:spLocks noGrp="1"/>
-          </p:cNvSpPr>
+              <a:t>SQL Planned</a:t>
+            </a:r>
+          </a:p>
+        </p:txBody>
+      </p:sp>
+      <p:pic>
+        <p:nvPicPr>
+          <p:cNvPr id="4" name="Content Placeholder 3"/>
+          <p:cNvPicPr>
+            <a:picLocks noGrp="1" noChangeAspect="1"/>
+          </p:cNvPicPr>
           <p:nvPr>
             <p:ph idx="1"/>
           </p:nvPr>
-        </p:nvSpPr>
-        <p:spPr/>
-        <p:txBody>
-          <a:bodyPr/>
-          <a:lstStyle/>
-          <a:p>
-            <a:endParaRPr lang="en-US"/>
-          </a:p>
-        </p:txBody>
-      </p:sp>
+        </p:nvPicPr>
+        <p:blipFill>
+          <a:blip r:embed="rId2"/>
+          <a:stretch>
+            <a:fillRect/>
+          </a:stretch>
+        </p:blipFill>
+        <p:spPr>
+          <a:xfrm>
+            <a:off x="1245704" y="1124413"/>
+            <a:ext cx="10124661" cy="5548056"/>
+          </a:xfrm>
+        </p:spPr>
+      </p:pic>
     </p:spTree>
     <p:extLst>
       <p:ext uri="{BB962C8B-B14F-4D97-AF65-F5344CB8AC3E}">
-        <p14:creationId xmlns:p14="http://schemas.microsoft.com/office/powerpoint/2010/main" val="2255266962"/>
+        <p14:creationId xmlns:p14="http://schemas.microsoft.com/office/powerpoint/2010/main" val="946687753"/>
       </p:ext>
     </p:extLst>
   </p:cSld>

</xml_diff>